<commit_message>
Weird changes, not sure what these all are
</commit_message>
<xml_diff>
--- a/posters/idies_symposium_2018/idies_symposium_2018_v8.pptx
+++ b/posters/idies_symposium_2018/idies_symposium_2018_v8.pptx
@@ -5931,217 +5931,6 @@
           </a:p>
         </p:txBody>
       </p:sp>
-      <p:pic>
-        <p:nvPicPr>
-          <p:cNvPr id="3" name="Picture 2">
-            <a:extLst>
-              <a:ext uri="{FF2B5EF4-FFF2-40B4-BE49-F238E27FC236}">
-                <a16:creationId xmlns:a16="http://schemas.microsoft.com/office/drawing/2014/main" id="{C807131A-EF6E-5145-A2E9-04A82662B3CC}"/>
-              </a:ext>
-            </a:extLst>
-          </p:cNvPr>
-          <p:cNvPicPr>
-            <a:picLocks noChangeAspect="1"/>
-          </p:cNvPicPr>
-          <p:nvPr/>
-        </p:nvPicPr>
-        <p:blipFill>
-          <a:blip r:embed="rId14"/>
-          <a:stretch>
-            <a:fillRect/>
-          </a:stretch>
-        </p:blipFill>
-        <p:spPr>
-          <a:xfrm>
-            <a:off x="6640490" y="8948774"/>
-            <a:ext cx="4127072" cy="1985926"/>
-          </a:xfrm>
-          <a:prstGeom prst="rect">
-            <a:avLst/>
-          </a:prstGeom>
-          <a:ln w="63500">
-            <a:solidFill>
-              <a:schemeClr val="tx2"/>
-            </a:solidFill>
-          </a:ln>
-        </p:spPr>
-      </p:pic>
-      <p:pic>
-        <p:nvPicPr>
-          <p:cNvPr id="23" name="Picture 22">
-            <a:extLst>
-              <a:ext uri="{FF2B5EF4-FFF2-40B4-BE49-F238E27FC236}">
-                <a16:creationId xmlns:a16="http://schemas.microsoft.com/office/drawing/2014/main" id="{7429570E-F061-8643-B324-77FC54C6F55C}"/>
-              </a:ext>
-            </a:extLst>
-          </p:cNvPr>
-          <p:cNvPicPr>
-            <a:picLocks noChangeAspect="1"/>
-          </p:cNvPicPr>
-          <p:nvPr/>
-        </p:nvPicPr>
-        <p:blipFill>
-          <a:blip r:embed="rId15"/>
-          <a:stretch>
-            <a:fillRect/>
-          </a:stretch>
-        </p:blipFill>
-        <p:spPr>
-          <a:xfrm>
-            <a:off x="11576050" y="8953500"/>
-            <a:ext cx="4115360" cy="1981200"/>
-          </a:xfrm>
-          <a:prstGeom prst="rect">
-            <a:avLst/>
-          </a:prstGeom>
-          <a:ln w="63500">
-            <a:solidFill>
-              <a:schemeClr val="tx2"/>
-            </a:solidFill>
-          </a:ln>
-        </p:spPr>
-      </p:pic>
-      <p:pic>
-        <p:nvPicPr>
-          <p:cNvPr id="27" name="Picture 26">
-            <a:extLst>
-              <a:ext uri="{FF2B5EF4-FFF2-40B4-BE49-F238E27FC236}">
-                <a16:creationId xmlns:a16="http://schemas.microsoft.com/office/drawing/2014/main" id="{5F399276-3FE0-2D4A-BB62-DF7EEE71D5EB}"/>
-              </a:ext>
-            </a:extLst>
-          </p:cNvPr>
-          <p:cNvPicPr>
-            <a:picLocks noChangeAspect="1"/>
-          </p:cNvPicPr>
-          <p:nvPr/>
-        </p:nvPicPr>
-        <p:blipFill>
-          <a:blip r:embed="rId16"/>
-          <a:stretch>
-            <a:fillRect/>
-          </a:stretch>
-        </p:blipFill>
-        <p:spPr>
-          <a:xfrm>
-            <a:off x="11423650" y="6085434"/>
-            <a:ext cx="1840683" cy="2076176"/>
-          </a:xfrm>
-          <a:prstGeom prst="rect">
-            <a:avLst/>
-          </a:prstGeom>
-          <a:ln w="63500">
-            <a:solidFill>
-              <a:schemeClr val="tx2"/>
-            </a:solidFill>
-          </a:ln>
-        </p:spPr>
-      </p:pic>
-      <p:pic>
-        <p:nvPicPr>
-          <p:cNvPr id="28" name="Picture 27">
-            <a:extLst>
-              <a:ext uri="{FF2B5EF4-FFF2-40B4-BE49-F238E27FC236}">
-                <a16:creationId xmlns:a16="http://schemas.microsoft.com/office/drawing/2014/main" id="{3ADB45D6-2164-6B4C-98EF-C7F608BB7348}"/>
-              </a:ext>
-            </a:extLst>
-          </p:cNvPr>
-          <p:cNvPicPr>
-            <a:picLocks noChangeAspect="1"/>
-          </p:cNvPicPr>
-          <p:nvPr/>
-        </p:nvPicPr>
-        <p:blipFill>
-          <a:blip r:embed="rId17"/>
-          <a:stretch>
-            <a:fillRect/>
-          </a:stretch>
-        </p:blipFill>
-        <p:spPr>
-          <a:xfrm>
-            <a:off x="14525586" y="4229100"/>
-            <a:ext cx="1546264" cy="1644070"/>
-          </a:xfrm>
-          <a:prstGeom prst="rect">
-            <a:avLst/>
-          </a:prstGeom>
-          <a:ln w="63500">
-            <a:solidFill>
-              <a:schemeClr val="tx2"/>
-            </a:solidFill>
-          </a:ln>
-        </p:spPr>
-      </p:pic>
-      <p:pic>
-        <p:nvPicPr>
-          <p:cNvPr id="29" name="Picture 28">
-            <a:extLst>
-              <a:ext uri="{FF2B5EF4-FFF2-40B4-BE49-F238E27FC236}">
-                <a16:creationId xmlns:a16="http://schemas.microsoft.com/office/drawing/2014/main" id="{DD86DA8D-6853-4F49-9679-C87B4B05ADF7}"/>
-              </a:ext>
-            </a:extLst>
-          </p:cNvPr>
-          <p:cNvPicPr>
-            <a:picLocks noChangeAspect="1"/>
-          </p:cNvPicPr>
-          <p:nvPr/>
-        </p:nvPicPr>
-        <p:blipFill>
-          <a:blip r:embed="rId18"/>
-          <a:stretch>
-            <a:fillRect/>
-          </a:stretch>
-        </p:blipFill>
-        <p:spPr>
-          <a:xfrm>
-            <a:off x="13568259" y="6085870"/>
-            <a:ext cx="2503591" cy="1800829"/>
-          </a:xfrm>
-          <a:prstGeom prst="rect">
-            <a:avLst/>
-          </a:prstGeom>
-          <a:ln w="63500">
-            <a:solidFill>
-              <a:schemeClr val="tx2"/>
-            </a:solidFill>
-          </a:ln>
-        </p:spPr>
-      </p:pic>
-      <p:sp>
-        <p:nvSpPr>
-          <p:cNvPr id="183" name="object 138"/>
-          <p:cNvSpPr/>
-          <p:nvPr/>
-        </p:nvSpPr>
-        <p:spPr>
-          <a:xfrm>
-            <a:off x="6546850" y="4076700"/>
-            <a:ext cx="4132056" cy="3906694"/>
-          </a:xfrm>
-          <a:prstGeom prst="rect">
-            <a:avLst/>
-          </a:prstGeom>
-          <a:blipFill>
-            <a:blip r:embed="rId19" cstate="print"/>
-            <a:stretch>
-              <a:fillRect/>
-            </a:stretch>
-          </a:blipFill>
-          <a:ln w="63500">
-            <a:solidFill>
-              <a:schemeClr val="accent1">
-                <a:lumMod val="75000"/>
-              </a:schemeClr>
-            </a:solidFill>
-          </a:ln>
-        </p:spPr>
-        <p:txBody>
-          <a:bodyPr wrap="square" lIns="0" tIns="0" rIns="0" bIns="0" rtlCol="0"/>
-          <a:lstStyle/>
-          <a:p>
-            <a:endParaRPr/>
-          </a:p>
-        </p:txBody>
-      </p:sp>
       <p:sp>
         <p:nvSpPr>
           <p:cNvPr id="31" name="TextBox 30"/>
@@ -6200,7 +5989,7 @@
                 <a:solidFill>
                   <a:schemeClr val="bg1"/>
                 </a:solidFill>
-                <a:hlinkClick r:id="rId20">
+                <a:hlinkClick r:id="rId14">
                   <a:extLst>
                     <a:ext uri="{A12FA001-AC4F-418D-AE19-62706E023703}">
                       <ahyp:hlinkClr xmlns:ahyp="http://schemas.microsoft.com/office/drawing/2018/hyperlinkcolor" val="tx"/>
@@ -6234,7 +6023,7 @@
                 <a:solidFill>
                   <a:schemeClr val="bg1"/>
                 </a:solidFill>
-                <a:hlinkClick r:id="rId21">
+                <a:hlinkClick r:id="rId15">
                   <a:extLst>
                     <a:ext uri="{A12FA001-AC4F-418D-AE19-62706E023703}">
                       <ahyp:hlinkClr xmlns:ahyp="http://schemas.microsoft.com/office/drawing/2018/hyperlinkcolor" val="tx"/>
@@ -6324,55 +6113,6 @@
           </a:p>
         </p:txBody>
       </p:sp>
-      <p:pic>
-        <p:nvPicPr>
-          <p:cNvPr id="2050" name="Picture 2"/>
-          <p:cNvPicPr>
-            <a:picLocks noChangeAspect="1" noChangeArrowheads="1"/>
-          </p:cNvPicPr>
-          <p:nvPr/>
-        </p:nvPicPr>
-        <p:blipFill>
-          <a:blip r:embed="rId22" cstate="print">
-            <a:extLst>
-              <a:ext uri="{28A0092B-C50C-407E-A947-70E740481C1C}">
-                <a14:useLocalDpi xmlns:a14="http://schemas.microsoft.com/office/drawing/2010/main" val="0"/>
-              </a:ext>
-            </a:extLst>
-          </a:blip>
-          <a:srcRect/>
-          <a:stretch>
-            <a:fillRect/>
-          </a:stretch>
-        </p:blipFill>
-        <p:spPr bwMode="auto">
-          <a:xfrm>
-            <a:off x="11423650" y="4172379"/>
-            <a:ext cx="2871108" cy="1662857"/>
-          </a:xfrm>
-          <a:prstGeom prst="rect">
-            <a:avLst/>
-          </a:prstGeom>
-          <a:noFill/>
-          <a:ln w="63500">
-            <a:solidFill>
-              <a:schemeClr val="tx2"/>
-            </a:solidFill>
-            <a:miter lim="800000"/>
-            <a:headEnd/>
-            <a:tailEnd/>
-          </a:ln>
-          <a:extLst>
-            <a:ext uri="{909E8E84-426E-40DD-AFC4-6F175D3DCCD1}">
-              <a14:hiddenFill xmlns:a14="http://schemas.microsoft.com/office/drawing/2010/main">
-                <a:solidFill>
-                  <a:schemeClr val="accent1"/>
-                </a:solidFill>
-              </a14:hiddenFill>
-            </a:ext>
-          </a:extLst>
-        </p:spPr>
-      </p:pic>
       <p:cxnSp>
         <p:nvCxnSpPr>
           <p:cNvPr id="192" name="Straight Arrow Connector 191"/>
@@ -6473,7 +6213,7 @@
         </p:nvSpPr>
         <p:spPr>
           <a:xfrm>
-            <a:off x="12282939" y="8464034"/>
+            <a:off x="12282939" y="8420100"/>
             <a:ext cx="3146261" cy="369332"/>
           </a:xfrm>
           <a:prstGeom prst="rect">
@@ -8690,67 +8430,6 @@
       </p:grpSp>
       <p:sp>
         <p:nvSpPr>
-          <p:cNvPr id="274" name="TextBox 273"/>
-          <p:cNvSpPr txBox="1"/>
-          <p:nvPr/>
-        </p:nvSpPr>
-        <p:spPr>
-          <a:xfrm>
-            <a:off x="3719524" y="9979104"/>
-            <a:ext cx="2074124" cy="830997"/>
-          </a:xfrm>
-          <a:prstGeom prst="rect">
-            <a:avLst/>
-          </a:prstGeom>
-          <a:noFill/>
-        </p:spPr>
-        <p:txBody>
-          <a:bodyPr wrap="square" rtlCol="0">
-            <a:spAutoFit/>
-          </a:bodyPr>
-          <a:lstStyle/>
-          <a:p>
-            <a:pPr marL="285750" indent="-285750">
-              <a:buFont typeface="Arial" panose="020B0604020202020204" pitchFamily="34" charset="0"/>
-              <a:buChar char="•"/>
-            </a:pPr>
-            <a:r>
-              <a:rPr lang="en-US" sz="1200" dirty="0"/>
-              <a:t>Docker Images</a:t>
-            </a:r>
-          </a:p>
-          <a:p>
-            <a:pPr marL="285750" indent="-285750">
-              <a:buFont typeface="Arial" panose="020B0604020202020204" pitchFamily="34" charset="0"/>
-              <a:buChar char="•"/>
-            </a:pPr>
-            <a:r>
-              <a:rPr lang="en-US" sz="1200" dirty="0"/>
-              <a:t>Example </a:t>
-            </a:r>
-            <a:r>
-              <a:rPr lang="en-US" sz="1200" dirty="0" err="1"/>
-              <a:t>Jupyter</a:t>
-            </a:r>
-            <a:r>
-              <a:rPr lang="en-US" sz="1200" dirty="0"/>
-              <a:t> Notebooks</a:t>
-            </a:r>
-          </a:p>
-          <a:p>
-            <a:pPr marL="285750" indent="-285750">
-              <a:buFont typeface="Arial" panose="020B0604020202020204" pitchFamily="34" charset="0"/>
-              <a:buChar char="•"/>
-            </a:pPr>
-            <a:r>
-              <a:rPr lang="en-US" sz="1200" dirty="0"/>
-              <a:t>API Reference</a:t>
-            </a:r>
-          </a:p>
-        </p:txBody>
-      </p:sp>
-      <p:sp>
-        <p:nvSpPr>
           <p:cNvPr id="279" name="Right Arrow 278"/>
           <p:cNvSpPr/>
           <p:nvPr/>
@@ -9174,36 +8853,6 @@
           </a:p>
         </p:txBody>
       </p:sp>
-      <p:pic>
-        <p:nvPicPr>
-          <p:cNvPr id="26" name="Picture 25">
-            <a:extLst>
-              <a:ext uri="{FF2B5EF4-FFF2-40B4-BE49-F238E27FC236}">
-                <a16:creationId xmlns:a16="http://schemas.microsoft.com/office/drawing/2014/main" id="{79E31396-4BA9-434A-863F-4CD352170D42}"/>
-              </a:ext>
-            </a:extLst>
-          </p:cNvPr>
-          <p:cNvPicPr>
-            <a:picLocks noChangeAspect="1"/>
-          </p:cNvPicPr>
-          <p:nvPr/>
-        </p:nvPicPr>
-        <p:blipFill>
-          <a:blip r:embed="rId23"/>
-          <a:stretch>
-            <a:fillRect/>
-          </a:stretch>
-        </p:blipFill>
-        <p:spPr>
-          <a:xfrm>
-            <a:off x="3702210" y="9410700"/>
-            <a:ext cx="1930240" cy="1687194"/>
-          </a:xfrm>
-          <a:prstGeom prst="rect">
-            <a:avLst/>
-          </a:prstGeom>
-        </p:spPr>
-      </p:pic>
       <p:sp>
         <p:nvSpPr>
           <p:cNvPr id="199" name="TextBox 198">
@@ -10011,6 +9660,329 @@
           </p:txBody>
         </p:sp>
       </p:grpSp>
+      <p:pic>
+        <p:nvPicPr>
+          <p:cNvPr id="33" name="Picture 32">
+            <a:extLst>
+              <a:ext uri="{FF2B5EF4-FFF2-40B4-BE49-F238E27FC236}">
+                <a16:creationId xmlns:a16="http://schemas.microsoft.com/office/drawing/2014/main" id="{35E3BF5C-55A1-4D45-8A21-ED3BF0DF7227}"/>
+              </a:ext>
+            </a:extLst>
+          </p:cNvPr>
+          <p:cNvPicPr>
+            <a:picLocks noChangeAspect="1"/>
+          </p:cNvPicPr>
+          <p:nvPr/>
+        </p:nvPicPr>
+        <p:blipFill>
+          <a:blip r:embed="rId16">
+            <a:extLst>
+              <a:ext uri="{28A0092B-C50C-407E-A947-70E740481C1C}">
+                <a14:useLocalDpi xmlns:a14="http://schemas.microsoft.com/office/drawing/2010/main" val="0"/>
+              </a:ext>
+            </a:extLst>
+          </a:blip>
+          <a:stretch>
+            <a:fillRect/>
+          </a:stretch>
+        </p:blipFill>
+        <p:spPr>
+          <a:xfrm>
+            <a:off x="3694811" y="9417573"/>
+            <a:ext cx="1962881" cy="1577315"/>
+          </a:xfrm>
+          <a:prstGeom prst="rect">
+            <a:avLst/>
+          </a:prstGeom>
+        </p:spPr>
+      </p:pic>
+      <p:pic>
+        <p:nvPicPr>
+          <p:cNvPr id="35" name="Picture 34">
+            <a:extLst>
+              <a:ext uri="{FF2B5EF4-FFF2-40B4-BE49-F238E27FC236}">
+                <a16:creationId xmlns:a16="http://schemas.microsoft.com/office/drawing/2014/main" id="{CC277CD6-B516-B744-B687-8EEEDB8679CF}"/>
+              </a:ext>
+            </a:extLst>
+          </p:cNvPr>
+          <p:cNvPicPr>
+            <a:picLocks noChangeAspect="1"/>
+          </p:cNvPicPr>
+          <p:nvPr/>
+        </p:nvPicPr>
+        <p:blipFill>
+          <a:blip r:embed="rId17">
+            <a:extLst>
+              <a:ext uri="{28A0092B-C50C-407E-A947-70E740481C1C}">
+                <a14:useLocalDpi xmlns:a14="http://schemas.microsoft.com/office/drawing/2010/main" val="0"/>
+              </a:ext>
+            </a:extLst>
+          </a:blip>
+          <a:stretch>
+            <a:fillRect/>
+          </a:stretch>
+        </p:blipFill>
+        <p:spPr>
+          <a:xfrm>
+            <a:off x="6587160" y="4256361"/>
+            <a:ext cx="4135827" cy="3477939"/>
+          </a:xfrm>
+          <a:prstGeom prst="rect">
+            <a:avLst/>
+          </a:prstGeom>
+          <a:ln w="63500">
+            <a:solidFill>
+              <a:schemeClr val="tx2"/>
+            </a:solidFill>
+          </a:ln>
+        </p:spPr>
+      </p:pic>
+      <p:pic>
+        <p:nvPicPr>
+          <p:cNvPr id="37" name="Picture 36">
+            <a:extLst>
+              <a:ext uri="{FF2B5EF4-FFF2-40B4-BE49-F238E27FC236}">
+                <a16:creationId xmlns:a16="http://schemas.microsoft.com/office/drawing/2014/main" id="{F8B62D19-89F5-874F-B2B3-560D99BAA16B}"/>
+              </a:ext>
+            </a:extLst>
+          </p:cNvPr>
+          <p:cNvPicPr>
+            <a:picLocks noChangeAspect="1"/>
+          </p:cNvPicPr>
+          <p:nvPr/>
+        </p:nvPicPr>
+        <p:blipFill>
+          <a:blip r:embed="rId18">
+            <a:extLst>
+              <a:ext uri="{28A0092B-C50C-407E-A947-70E740481C1C}">
+                <a14:useLocalDpi xmlns:a14="http://schemas.microsoft.com/office/drawing/2010/main" val="0"/>
+              </a:ext>
+            </a:extLst>
+          </a:blip>
+          <a:stretch>
+            <a:fillRect/>
+          </a:stretch>
+        </p:blipFill>
+        <p:spPr>
+          <a:xfrm>
+            <a:off x="6628359" y="8950049"/>
+            <a:ext cx="4250678" cy="1988101"/>
+          </a:xfrm>
+          <a:prstGeom prst="rect">
+            <a:avLst/>
+          </a:prstGeom>
+          <a:ln w="63500">
+            <a:solidFill>
+              <a:schemeClr val="tx2"/>
+            </a:solidFill>
+          </a:ln>
+        </p:spPr>
+      </p:pic>
+      <p:pic>
+        <p:nvPicPr>
+          <p:cNvPr id="39" name="Picture 38">
+            <a:extLst>
+              <a:ext uri="{FF2B5EF4-FFF2-40B4-BE49-F238E27FC236}">
+                <a16:creationId xmlns:a16="http://schemas.microsoft.com/office/drawing/2014/main" id="{C71C89B2-9481-5142-AF57-9EFE7F8FE3AF}"/>
+              </a:ext>
+            </a:extLst>
+          </p:cNvPr>
+          <p:cNvPicPr>
+            <a:picLocks noChangeAspect="1"/>
+          </p:cNvPicPr>
+          <p:nvPr/>
+        </p:nvPicPr>
+        <p:blipFill>
+          <a:blip r:embed="rId19">
+            <a:extLst>
+              <a:ext uri="{28A0092B-C50C-407E-A947-70E740481C1C}">
+                <a14:useLocalDpi xmlns:a14="http://schemas.microsoft.com/office/drawing/2010/main" val="0"/>
+              </a:ext>
+            </a:extLst>
+          </a:blip>
+          <a:stretch>
+            <a:fillRect/>
+          </a:stretch>
+        </p:blipFill>
+        <p:spPr>
+          <a:xfrm>
+            <a:off x="11477155" y="8953813"/>
+            <a:ext cx="4360417" cy="2039427"/>
+          </a:xfrm>
+          <a:prstGeom prst="rect">
+            <a:avLst/>
+          </a:prstGeom>
+          <a:ln w="63500">
+            <a:solidFill>
+              <a:schemeClr val="tx2"/>
+            </a:solidFill>
+          </a:ln>
+        </p:spPr>
+      </p:pic>
+      <p:pic>
+        <p:nvPicPr>
+          <p:cNvPr id="43" name="Picture 42">
+            <a:extLst>
+              <a:ext uri="{FF2B5EF4-FFF2-40B4-BE49-F238E27FC236}">
+                <a16:creationId xmlns:a16="http://schemas.microsoft.com/office/drawing/2014/main" id="{411B950C-5C77-5543-A4F7-548E4831C349}"/>
+              </a:ext>
+            </a:extLst>
+          </p:cNvPr>
+          <p:cNvPicPr>
+            <a:picLocks noChangeAspect="1"/>
+          </p:cNvPicPr>
+          <p:nvPr/>
+        </p:nvPicPr>
+        <p:blipFill>
+          <a:blip r:embed="rId20">
+            <a:extLst>
+              <a:ext uri="{28A0092B-C50C-407E-A947-70E740481C1C}">
+                <a14:useLocalDpi xmlns:a14="http://schemas.microsoft.com/office/drawing/2010/main" val="0"/>
+              </a:ext>
+            </a:extLst>
+          </a:blip>
+          <a:stretch>
+            <a:fillRect/>
+          </a:stretch>
+        </p:blipFill>
+        <p:spPr>
+          <a:xfrm>
+            <a:off x="11427722" y="4076700"/>
+            <a:ext cx="2861860" cy="1837243"/>
+          </a:xfrm>
+          <a:prstGeom prst="rect">
+            <a:avLst/>
+          </a:prstGeom>
+          <a:ln w="63500">
+            <a:solidFill>
+              <a:schemeClr val="tx2"/>
+            </a:solidFill>
+          </a:ln>
+        </p:spPr>
+      </p:pic>
+      <p:pic>
+        <p:nvPicPr>
+          <p:cNvPr id="45" name="Picture 44">
+            <a:extLst>
+              <a:ext uri="{FF2B5EF4-FFF2-40B4-BE49-F238E27FC236}">
+                <a16:creationId xmlns:a16="http://schemas.microsoft.com/office/drawing/2014/main" id="{CEF3D6F2-0105-414C-BF6F-204BDEA85CBF}"/>
+              </a:ext>
+            </a:extLst>
+          </p:cNvPr>
+          <p:cNvPicPr>
+            <a:picLocks noChangeAspect="1"/>
+          </p:cNvPicPr>
+          <p:nvPr/>
+        </p:nvPicPr>
+        <p:blipFill>
+          <a:blip r:embed="rId21">
+            <a:extLst>
+              <a:ext uri="{28A0092B-C50C-407E-A947-70E740481C1C}">
+                <a14:useLocalDpi xmlns:a14="http://schemas.microsoft.com/office/drawing/2010/main" val="0"/>
+              </a:ext>
+            </a:extLst>
+          </a:blip>
+          <a:stretch>
+            <a:fillRect/>
+          </a:stretch>
+        </p:blipFill>
+        <p:spPr>
+          <a:xfrm>
+            <a:off x="14525586" y="4152900"/>
+            <a:ext cx="1535706" cy="1634783"/>
+          </a:xfrm>
+          <a:prstGeom prst="rect">
+            <a:avLst/>
+          </a:prstGeom>
+          <a:ln w="63500">
+            <a:solidFill>
+              <a:schemeClr val="tx2"/>
+            </a:solidFill>
+          </a:ln>
+        </p:spPr>
+      </p:pic>
+      <p:pic>
+        <p:nvPicPr>
+          <p:cNvPr id="47" name="Picture 46">
+            <a:extLst>
+              <a:ext uri="{FF2B5EF4-FFF2-40B4-BE49-F238E27FC236}">
+                <a16:creationId xmlns:a16="http://schemas.microsoft.com/office/drawing/2014/main" id="{39E67EC5-A60B-0148-904C-F0A3E1C23175}"/>
+              </a:ext>
+            </a:extLst>
+          </p:cNvPr>
+          <p:cNvPicPr>
+            <a:picLocks noChangeAspect="1"/>
+          </p:cNvPicPr>
+          <p:nvPr/>
+        </p:nvPicPr>
+        <p:blipFill>
+          <a:blip r:embed="rId22">
+            <a:extLst>
+              <a:ext uri="{28A0092B-C50C-407E-A947-70E740481C1C}">
+                <a14:useLocalDpi xmlns:a14="http://schemas.microsoft.com/office/drawing/2010/main" val="0"/>
+              </a:ext>
+            </a:extLst>
+          </a:blip>
+          <a:stretch>
+            <a:fillRect/>
+          </a:stretch>
+        </p:blipFill>
+        <p:spPr>
+          <a:xfrm>
+            <a:off x="11649937" y="6150751"/>
+            <a:ext cx="1450113" cy="1964549"/>
+          </a:xfrm>
+          <a:prstGeom prst="rect">
+            <a:avLst/>
+          </a:prstGeom>
+          <a:ln w="63500">
+            <a:solidFill>
+              <a:schemeClr val="tx2"/>
+            </a:solidFill>
+          </a:ln>
+        </p:spPr>
+      </p:pic>
+      <p:pic>
+        <p:nvPicPr>
+          <p:cNvPr id="49" name="Picture 48">
+            <a:extLst>
+              <a:ext uri="{FF2B5EF4-FFF2-40B4-BE49-F238E27FC236}">
+                <a16:creationId xmlns:a16="http://schemas.microsoft.com/office/drawing/2014/main" id="{41A2904D-DCCC-7648-A31A-0FE64F7E0D58}"/>
+              </a:ext>
+            </a:extLst>
+          </p:cNvPr>
+          <p:cNvPicPr>
+            <a:picLocks noChangeAspect="1"/>
+          </p:cNvPicPr>
+          <p:nvPr/>
+        </p:nvPicPr>
+        <p:blipFill>
+          <a:blip r:embed="rId23">
+            <a:extLst>
+              <a:ext uri="{28A0092B-C50C-407E-A947-70E740481C1C}">
+                <a14:useLocalDpi xmlns:a14="http://schemas.microsoft.com/office/drawing/2010/main" val="0"/>
+              </a:ext>
+            </a:extLst>
+          </a:blip>
+          <a:stretch>
+            <a:fillRect/>
+          </a:stretch>
+        </p:blipFill>
+        <p:spPr>
+          <a:xfrm>
+            <a:off x="13557250" y="6128883"/>
+            <a:ext cx="2472887" cy="1986417"/>
+          </a:xfrm>
+          <a:prstGeom prst="rect">
+            <a:avLst/>
+          </a:prstGeom>
+          <a:ln w="63500">
+            <a:solidFill>
+              <a:schemeClr val="tx2"/>
+            </a:solidFill>
+          </a:ln>
+        </p:spPr>
+      </p:pic>
     </p:spTree>
     <p:extLst>
       <p:ext uri="{BB962C8B-B14F-4D97-AF65-F5344CB8AC3E}">

</xml_diff>